<commit_message>
memo for function component
React.memo (function-name):
Prevent the functional comonent update UI if no props and no satte change,
No UI updated will be called,
</commit_message>
<xml_diff>
--- a/27_Memo.pptx
+++ b/27_Memo.pptx
@@ -5,7 +5,7 @@
     <p:sldMasterId id="2147483648" r:id="rId1"/>
   </p:sldMasterIdLst>
   <p:notesMasterIdLst>
-    <p:notesMasterId r:id="rId13"/>
+    <p:notesMasterId r:id="rId15"/>
   </p:notesMasterIdLst>
   <p:sldIdLst>
     <p:sldId id="256" r:id="rId2"/>
@@ -18,7 +18,9 @@
     <p:sldId id="274" r:id="rId9"/>
     <p:sldId id="275" r:id="rId10"/>
     <p:sldId id="276" r:id="rId11"/>
-    <p:sldId id="259" r:id="rId12"/>
+    <p:sldId id="279" r:id="rId12"/>
+    <p:sldId id="280" r:id="rId13"/>
+    <p:sldId id="259" r:id="rId14"/>
   </p:sldIdLst>
   <p:sldSz cx="9144000" cy="6858000" type="screen4x3"/>
   <p:notesSz cx="6858000" cy="9144000"/>
@@ -219,7 +221,7 @@
             <a:fld id="{6837EDA8-41C8-4B24-A206-13C08A65A6D7}" type="datetimeFigureOut">
               <a:rPr lang="zh-TW" altLang="en-US" smtClean="0"/>
               <a:pPr/>
-              <a:t>2020/5/25</a:t>
+              <a:t>2020/6/28</a:t>
             </a:fld>
             <a:endParaRPr lang="zh-TW" altLang="en-US"/>
           </a:p>
@@ -672,7 +674,7 @@
             <a:fld id="{8B85509C-BD4F-47BF-9B1E-FC2E949B3621}" type="datetime1">
               <a:rPr lang="zh-TW" altLang="en-US" smtClean="0"/>
               <a:pPr/>
-              <a:t>2020/5/25</a:t>
+              <a:t>2020/6/28</a:t>
             </a:fld>
             <a:endParaRPr lang="zh-TW" altLang="en-US"/>
           </a:p>
@@ -845,7 +847,7 @@
             <a:fld id="{42251B24-F787-4C15-8A0F-7AEC20C70069}" type="datetime1">
               <a:rPr lang="zh-TW" altLang="en-US" smtClean="0"/>
               <a:pPr/>
-              <a:t>2020/5/25</a:t>
+              <a:t>2020/6/28</a:t>
             </a:fld>
             <a:endParaRPr lang="zh-TW" altLang="en-US"/>
           </a:p>
@@ -1020,7 +1022,7 @@
             <a:fld id="{9CA0D33C-CE2B-45F1-B8D4-FFD1F131F331}" type="datetime1">
               <a:rPr lang="zh-TW" altLang="en-US" smtClean="0"/>
               <a:pPr/>
-              <a:t>2020/5/25</a:t>
+              <a:t>2020/6/28</a:t>
             </a:fld>
             <a:endParaRPr lang="zh-TW" altLang="en-US"/>
           </a:p>
@@ -1185,7 +1187,7 @@
             <a:fld id="{50B99440-D9EF-40CC-9B52-F6428D9B2C76}" type="datetime1">
               <a:rPr lang="zh-TW" altLang="en-US" smtClean="0"/>
               <a:pPr/>
-              <a:t>2020/5/25</a:t>
+              <a:t>2020/6/28</a:t>
             </a:fld>
             <a:endParaRPr lang="zh-TW" altLang="en-US"/>
           </a:p>
@@ -1427,7 +1429,7 @@
             <a:fld id="{0871BF52-5C6C-4959-8E27-CECB68D39FE4}" type="datetime1">
               <a:rPr lang="zh-TW" altLang="en-US" smtClean="0"/>
               <a:pPr/>
-              <a:t>2020/5/25</a:t>
+              <a:t>2020/6/28</a:t>
             </a:fld>
             <a:endParaRPr lang="zh-TW" altLang="en-US"/>
           </a:p>
@@ -1709,7 +1711,7 @@
             <a:fld id="{DF863F05-2DD9-4EB1-A827-12FD992DE9DC}" type="datetime1">
               <a:rPr lang="zh-TW" altLang="en-US" smtClean="0"/>
               <a:pPr/>
-              <a:t>2020/5/25</a:t>
+              <a:t>2020/6/28</a:t>
             </a:fld>
             <a:endParaRPr lang="zh-TW" altLang="en-US"/>
           </a:p>
@@ -2125,7 +2127,7 @@
             <a:fld id="{6339AF51-4491-4873-A096-75DB6CE47516}" type="datetime1">
               <a:rPr lang="zh-TW" altLang="en-US" smtClean="0"/>
               <a:pPr/>
-              <a:t>2020/5/25</a:t>
+              <a:t>2020/6/28</a:t>
             </a:fld>
             <a:endParaRPr lang="zh-TW" altLang="en-US"/>
           </a:p>
@@ -2239,7 +2241,7 @@
             <a:fld id="{EE4AD9C8-8B9E-40FF-ABE2-858AC2057BBB}" type="datetime1">
               <a:rPr lang="zh-TW" altLang="en-US" smtClean="0"/>
               <a:pPr/>
-              <a:t>2020/5/25</a:t>
+              <a:t>2020/6/28</a:t>
             </a:fld>
             <a:endParaRPr lang="zh-TW" altLang="en-US"/>
           </a:p>
@@ -2331,7 +2333,7 @@
             <a:fld id="{B4784999-BBBE-4BE4-A8D0-877E7D1D66CC}" type="datetime1">
               <a:rPr lang="zh-TW" altLang="en-US" smtClean="0"/>
               <a:pPr/>
-              <a:t>2020/5/25</a:t>
+              <a:t>2020/6/28</a:t>
             </a:fld>
             <a:endParaRPr lang="zh-TW" altLang="en-US"/>
           </a:p>
@@ -2603,7 +2605,7 @@
             <a:fld id="{E88D17E6-02BD-4944-B9FE-7BFCCBF83D48}" type="datetime1">
               <a:rPr lang="zh-TW" altLang="en-US" smtClean="0"/>
               <a:pPr/>
-              <a:t>2020/5/25</a:t>
+              <a:t>2020/6/28</a:t>
             </a:fld>
             <a:endParaRPr lang="zh-TW" altLang="en-US"/>
           </a:p>
@@ -2852,7 +2854,7 @@
             <a:fld id="{3C13E23D-1FEF-4D78-A3A3-3D6F2BB31954}" type="datetime1">
               <a:rPr lang="zh-TW" altLang="en-US" smtClean="0"/>
               <a:pPr/>
-              <a:t>2020/5/25</a:t>
+              <a:t>2020/6/28</a:t>
             </a:fld>
             <a:endParaRPr lang="zh-TW" altLang="en-US"/>
           </a:p>
@@ -3060,7 +3062,7 @@
             <a:fld id="{06197F35-AD6F-4594-8B50-334492D2E7E8}" type="datetime1">
               <a:rPr lang="zh-TW" altLang="en-US" smtClean="0"/>
               <a:pPr/>
-              <a:t>2020/5/25</a:t>
+              <a:t>2020/6/28</a:t>
             </a:fld>
             <a:endParaRPr lang="zh-TW" altLang="en-US"/>
           </a:p>
@@ -3521,7 +3523,7 @@
             <a:fld id="{C389EDC9-19E3-47AC-9C57-C6A24DEA81AD}" type="datetime1">
               <a:rPr lang="zh-TW" altLang="en-US" smtClean="0"/>
               <a:pPr/>
-              <a:t>2020/5/25</a:t>
+              <a:t>2020/6/28</a:t>
             </a:fld>
             <a:endParaRPr lang="zh-TW" altLang="en-US"/>
           </a:p>
@@ -3920,7 +3922,7 @@
             <a:fld id="{A4F910E6-8D00-4BAF-8C48-9688E0B449D3}" type="datetime1">
               <a:rPr lang="zh-TW" altLang="en-US" smtClean="0"/>
               <a:pPr/>
-              <a:t>2020/5/25</a:t>
+              <a:t>2020/6/28</a:t>
             </a:fld>
             <a:endParaRPr lang="zh-TW" altLang="en-US"/>
           </a:p>
@@ -4087,32 +4089,9 @@
             <a:off x="0" y="2130425"/>
             <a:ext cx="9144000" cy="1470025"/>
           </a:xfrm>
-          <a:gradFill flip="none" rotWithShape="1">
-            <a:gsLst>
-              <a:gs pos="0">
-                <a:srgbClr val="00B0F0">
-                  <a:shade val="30000"/>
-                  <a:satMod val="115000"/>
-                </a:srgbClr>
-              </a:gs>
-              <a:gs pos="50000">
-                <a:srgbClr val="00B0F0">
-                  <a:shade val="67500"/>
-                  <a:satMod val="115000"/>
-                </a:srgbClr>
-              </a:gs>
-              <a:gs pos="100000">
-                <a:srgbClr val="00B0F0">
-                  <a:shade val="100000"/>
-                  <a:satMod val="115000"/>
-                </a:srgbClr>
-              </a:gs>
-            </a:gsLst>
-            <a:path path="circle">
-              <a:fillToRect t="100000" r="100000"/>
-            </a:path>
-            <a:tileRect l="-100000" b="-100000"/>
-          </a:gradFill>
+          <a:solidFill>
+            <a:srgbClr val="00B0F0"/>
+          </a:solidFill>
         </p:spPr>
         <p:txBody>
           <a:bodyPr>
@@ -4121,14 +4100,14 @@
           <a:lstStyle/>
           <a:p>
             <a:r>
-              <a:rPr lang="en-US" altLang="zh-TW" sz="6000" b="1" dirty="0">
+              <a:rPr lang="en-US" altLang="zh-TW" sz="3600" b="1" dirty="0">
                 <a:solidFill>
                   <a:srgbClr val="FFFF00"/>
                 </a:solidFill>
               </a:rPr>
-              <a:t>End of Chapter</a:t>
-            </a:r>
-            <a:endParaRPr lang="zh-TW" altLang="en-US" sz="6000" b="1" dirty="0">
+              <a:t>27.3 Quiz</a:t>
+            </a:r>
+            <a:endParaRPr lang="zh-TW" altLang="en-US" sz="3600" b="1" dirty="0">
               <a:solidFill>
                 <a:srgbClr val="FFFF00"/>
               </a:solidFill>
@@ -4151,10 +4130,10 @@
           <a:bodyPr/>
           <a:lstStyle/>
           <a:p>
-            <a:fld id="{4E46BE27-E923-4EC2-B046-3272AE2A3E5C}" type="datetime1">
+            <a:fld id="{C389EDC9-19E3-47AC-9C57-C6A24DEA81AD}" type="datetime1">
               <a:rPr lang="zh-TW" altLang="en-US" smtClean="0"/>
               <a:pPr/>
-              <a:t>2020/5/25</a:t>
+              <a:t>2020/6/28</a:t>
             </a:fld>
             <a:endParaRPr lang="zh-TW" altLang="en-US"/>
           </a:p>
@@ -4184,7 +4163,44 @@
           </a:p>
         </p:txBody>
       </p:sp>
+      <p:pic>
+        <p:nvPicPr>
+          <p:cNvPr id="2050" name="Picture 2"/>
+          <p:cNvPicPr>
+            <a:picLocks noChangeAspect="1" noChangeArrowheads="1"/>
+          </p:cNvPicPr>
+          <p:nvPr/>
+        </p:nvPicPr>
+        <p:blipFill>
+          <a:blip r:embed="rId2" cstate="print"/>
+          <a:srcRect/>
+          <a:stretch>
+            <a:fillRect/>
+          </a:stretch>
+        </p:blipFill>
+        <p:spPr bwMode="auto">
+          <a:xfrm>
+            <a:off x="4283968" y="3717032"/>
+            <a:ext cx="713805" cy="644588"/>
+          </a:xfrm>
+          <a:prstGeom prst="rect">
+            <a:avLst/>
+          </a:prstGeom>
+          <a:noFill/>
+          <a:ln w="9525">
+            <a:noFill/>
+            <a:miter lim="800000"/>
+            <a:headEnd/>
+            <a:tailEnd/>
+          </a:ln>
+        </p:spPr>
+      </p:pic>
     </p:spTree>
+    <p:extLst>
+      <p:ext uri="{BB962C8B-B14F-4D97-AF65-F5344CB8AC3E}">
+        <p14:creationId xmlns:p14="http://schemas.microsoft.com/office/powerpoint/2010/main" val="2933236172"/>
+      </p:ext>
+    </p:extLst>
   </p:cSld>
   <p:clrMapOvr>
     <a:masterClrMapping/>
@@ -4192,7 +4208,7 @@
 </p:sld>
 </file>
 
-<file path=ppt/slides/slide2.xml><?xml version="1.0" encoding="utf-8"?>
+<file path=ppt/slides/slide12.xml><?xml version="1.0" encoding="utf-8"?>
 <p:sld xmlns:a="http://schemas.openxmlformats.org/drawingml/2006/main" xmlns:r="http://schemas.openxmlformats.org/officeDocument/2006/relationships" xmlns:p="http://schemas.openxmlformats.org/presentationml/2006/main">
   <p:cSld>
     <p:spTree>
@@ -4264,7 +4280,7 @@
                   <a:srgbClr val="FFFF00"/>
                 </a:solidFill>
               </a:rPr>
-              <a:t>27 Memo</a:t>
+              <a:t>27.3 Quiz</a:t>
             </a:r>
             <a:endParaRPr lang="zh-TW" altLang="en-US" sz="3600" b="1" dirty="0">
               <a:solidFill>
@@ -4286,8 +4302,8 @@
         </p:nvSpPr>
         <p:spPr>
           <a:xfrm>
-            <a:off x="467544" y="1340762"/>
-            <a:ext cx="8219256" cy="3960446"/>
+            <a:off x="467544" y="1340763"/>
+            <a:ext cx="8219256" cy="2592293"/>
           </a:xfrm>
           <a:ln>
             <a:solidFill>
@@ -4316,7 +4332,7 @@
                 </a:solidFill>
                 <a:latin typeface="+mj-lt"/>
               </a:rPr>
-              <a:t>Memo</a:t>
+              <a:t>Quiz</a:t>
             </a:r>
           </a:p>
           <a:p>
@@ -4335,7 +4351,7 @@
                 </a:solidFill>
                 <a:latin typeface="+mj-lt"/>
               </a:rPr>
-              <a:t>We discuss pure component in the last discussion.</a:t>
+              <a:t>1. What is memo component?</a:t>
             </a:r>
           </a:p>
           <a:p>
@@ -4354,7 +4370,7 @@
                 </a:solidFill>
                 <a:latin typeface="+mj-lt"/>
               </a:rPr>
-              <a:t>The pure component only re-render the class component when there is a difference in the shallow comparison of props and state.</a:t>
+              <a:t>Ans:</a:t>
             </a:r>
           </a:p>
           <a:p>
@@ -4373,7 +4389,7 @@
                 </a:solidFill>
                 <a:latin typeface="+mj-lt"/>
               </a:rPr>
-              <a:t>The pure component using the shallow component comparison of props and state and results in a performance improvement.</a:t>
+              <a:t>a) Memo component is used for performance optimization for functional component (Similar to the pure component in class component).</a:t>
             </a:r>
           </a:p>
           <a:p>
@@ -4392,7 +4408,7 @@
                 </a:solidFill>
                 <a:latin typeface="+mj-lt"/>
               </a:rPr>
-              <a:t>Pure component only works with class based components.</a:t>
+              <a:t>b) Memo component uses Higher Order component to wrap the render function to prevent UI update if props and state are not changed.</a:t>
             </a:r>
           </a:p>
           <a:p>
@@ -4411,16 +4427,16 @@
                 </a:solidFill>
                 <a:latin typeface="+mj-lt"/>
               </a:rPr>
-              <a:t>It would be nice if we can achieve the </a:t>
-            </a:r>
-            <a:r>
-              <a:rPr lang="en-US" altLang="zh-TW" sz="1800" b="1" dirty="0">
-                <a:solidFill>
-                  <a:srgbClr val="C00000"/>
+              <a:t>c) </a:t>
+            </a:r>
+            <a:r>
+              <a:rPr lang="en-US" altLang="zh-TW" sz="1800" dirty="0" err="1">
+                <a:solidFill>
+                  <a:schemeClr val="tx1"/>
                 </a:solidFill>
                 <a:latin typeface="+mj-lt"/>
               </a:rPr>
-              <a:t>same in functional components </a:t>
+              <a:t>React.memo</a:t>
             </a:r>
             <a:r>
               <a:rPr lang="en-US" altLang="zh-TW" sz="1800" dirty="0">
@@ -4429,82 +4445,7 @@
                 </a:solidFill>
                 <a:latin typeface="+mj-lt"/>
               </a:rPr>
-              <a:t>as well.</a:t>
-            </a:r>
-          </a:p>
-          <a:p>
-            <a:pPr marL="342900" indent="-342900" algn="l">
-              <a:buClr>
-                <a:srgbClr val="0070C0"/>
-              </a:buClr>
-              <a:buSzPct val="80000"/>
-              <a:buFont typeface="Wingdings" pitchFamily="2" charset="2"/>
-              <a:buChar char="u"/>
-            </a:pPr>
-            <a:r>
-              <a:rPr lang="en-US" altLang="zh-TW" sz="1800" b="1" dirty="0">
-                <a:solidFill>
-                  <a:srgbClr val="C00000"/>
-                </a:solidFill>
-                <a:latin typeface="+mj-lt"/>
-              </a:rPr>
-              <a:t>That is where </a:t>
-            </a:r>
-            <a:r>
-              <a:rPr lang="en-US" altLang="zh-TW" sz="1800" b="1" dirty="0" err="1">
-                <a:solidFill>
-                  <a:srgbClr val="C00000"/>
-                </a:solidFill>
-                <a:latin typeface="+mj-lt"/>
-              </a:rPr>
-              <a:t>React.memo</a:t>
-            </a:r>
-            <a:r>
-              <a:rPr lang="en-US" altLang="zh-TW" sz="1800" b="1" dirty="0">
-                <a:solidFill>
-                  <a:srgbClr val="C00000"/>
-                </a:solidFill>
-                <a:latin typeface="+mj-lt"/>
-              </a:rPr>
-              <a:t> comes into the picture.</a:t>
-            </a:r>
-          </a:p>
-          <a:p>
-            <a:pPr marL="342900" indent="-342900" algn="l">
-              <a:buClr>
-                <a:srgbClr val="0070C0"/>
-              </a:buClr>
-              <a:buSzPct val="80000"/>
-              <a:buFont typeface="Wingdings" pitchFamily="2" charset="2"/>
-              <a:buChar char="u"/>
-            </a:pPr>
-            <a:r>
-              <a:rPr lang="en-US" altLang="zh-TW" sz="1800" b="1" dirty="0">
-                <a:solidFill>
-                  <a:srgbClr val="C00000"/>
-                </a:solidFill>
-                <a:latin typeface="+mj-lt"/>
-              </a:rPr>
-              <a:t>What is memo component?</a:t>
-            </a:r>
-          </a:p>
-          <a:p>
-            <a:pPr marL="342900" indent="-342900" algn="l">
-              <a:buClr>
-                <a:srgbClr val="0070C0"/>
-              </a:buClr>
-              <a:buSzPct val="80000"/>
-              <a:buFont typeface="Wingdings" pitchFamily="2" charset="2"/>
-              <a:buChar char="u"/>
-            </a:pPr>
-            <a:r>
-              <a:rPr lang="en-US" altLang="zh-TW" sz="1800" b="1" dirty="0">
-                <a:solidFill>
-                  <a:srgbClr val="C00000"/>
-                </a:solidFill>
-                <a:latin typeface="+mj-lt"/>
-              </a:rPr>
-              <a:t>The pure component is for class based component and the memo component is for functional component. </a:t>
+              <a:t> (function-name) as below.</a:t>
             </a:r>
           </a:p>
         </p:txBody>
@@ -4591,7 +4532,626 @@
             <a:fld id="{A4F910E6-8D00-4BAF-8C48-9688E0B449D3}" type="datetime1">
               <a:rPr lang="zh-TW" altLang="en-US" smtClean="0"/>
               <a:pPr/>
-              <a:t>2020/5/25</a:t>
+              <a:t>2020/6/28</a:t>
+            </a:fld>
+            <a:endParaRPr lang="zh-TW" altLang="en-US"/>
+          </a:p>
+        </p:txBody>
+      </p:sp>
+      <p:sp>
+        <p:nvSpPr>
+          <p:cNvPr id="6" name="投影片編號版面配置區 5"/>
+          <p:cNvSpPr>
+            <a:spLocks noGrp="1"/>
+          </p:cNvSpPr>
+          <p:nvPr>
+            <p:ph type="sldNum" sz="quarter" idx="12"/>
+          </p:nvPr>
+        </p:nvSpPr>
+        <p:spPr>
+          <a:xfrm>
+            <a:off x="6553200" y="6356350"/>
+            <a:ext cx="2133600" cy="404246"/>
+          </a:xfrm>
+        </p:spPr>
+        <p:txBody>
+          <a:bodyPr/>
+          <a:lstStyle/>
+          <a:p>
+            <a:fld id="{E4D7E63D-91F2-4366-A2C4-1B00C9E2590E}" type="slidenum">
+              <a:rPr lang="zh-TW" altLang="en-US" smtClean="0"/>
+              <a:pPr/>
+              <a:t>12</a:t>
+            </a:fld>
+            <a:endParaRPr lang="zh-TW" altLang="en-US"/>
+          </a:p>
+        </p:txBody>
+      </p:sp>
+      <p:pic>
+        <p:nvPicPr>
+          <p:cNvPr id="10" name="Picture 9">
+            <a:extLst>
+              <a:ext uri="{FF2B5EF4-FFF2-40B4-BE49-F238E27FC236}">
+                <a16:creationId xmlns:a16="http://schemas.microsoft.com/office/drawing/2014/main" id="{03837E39-F2E5-4FDD-9046-34180D689CBD}"/>
+              </a:ext>
+            </a:extLst>
+          </p:cNvPr>
+          <p:cNvPicPr>
+            <a:picLocks noChangeAspect="1"/>
+          </p:cNvPicPr>
+          <p:nvPr/>
+        </p:nvPicPr>
+        <p:blipFill>
+          <a:blip r:embed="rId3"/>
+          <a:stretch>
+            <a:fillRect/>
+          </a:stretch>
+        </p:blipFill>
+        <p:spPr>
+          <a:xfrm>
+            <a:off x="5004048" y="3713414"/>
+            <a:ext cx="3809680" cy="2838944"/>
+          </a:xfrm>
+          <a:prstGeom prst="rect">
+            <a:avLst/>
+          </a:prstGeom>
+          <a:ln>
+            <a:solidFill>
+              <a:srgbClr val="C00000"/>
+            </a:solidFill>
+          </a:ln>
+        </p:spPr>
+      </p:pic>
+    </p:spTree>
+    <p:extLst>
+      <p:ext uri="{BB962C8B-B14F-4D97-AF65-F5344CB8AC3E}">
+        <p14:creationId xmlns:p14="http://schemas.microsoft.com/office/powerpoint/2010/main" val="1952981562"/>
+      </p:ext>
+    </p:extLst>
+  </p:cSld>
+  <p:clrMapOvr>
+    <a:masterClrMapping/>
+  </p:clrMapOvr>
+</p:sld>
+</file>
+
+<file path=ppt/slides/slide13.xml><?xml version="1.0" encoding="utf-8"?>
+<p:sld xmlns:a="http://schemas.openxmlformats.org/drawingml/2006/main" xmlns:r="http://schemas.openxmlformats.org/officeDocument/2006/relationships" xmlns:p="http://schemas.openxmlformats.org/presentationml/2006/main">
+  <p:cSld>
+    <p:spTree>
+      <p:nvGrpSpPr>
+        <p:cNvPr id="1" name=""/>
+        <p:cNvGrpSpPr/>
+        <p:nvPr/>
+      </p:nvGrpSpPr>
+      <p:grpSpPr>
+        <a:xfrm>
+          <a:off x="0" y="0"/>
+          <a:ext cx="0" cy="0"/>
+          <a:chOff x="0" y="0"/>
+          <a:chExt cx="0" cy="0"/>
+        </a:xfrm>
+      </p:grpSpPr>
+      <p:sp>
+        <p:nvSpPr>
+          <p:cNvPr id="2" name="標題 1"/>
+          <p:cNvSpPr>
+            <a:spLocks noGrp="1"/>
+          </p:cNvSpPr>
+          <p:nvPr>
+            <p:ph type="ctrTitle"/>
+          </p:nvPr>
+        </p:nvSpPr>
+        <p:spPr>
+          <a:xfrm>
+            <a:off x="0" y="2130425"/>
+            <a:ext cx="9144000" cy="1470025"/>
+          </a:xfrm>
+          <a:gradFill flip="none" rotWithShape="1">
+            <a:gsLst>
+              <a:gs pos="0">
+                <a:srgbClr val="00B0F0">
+                  <a:shade val="30000"/>
+                  <a:satMod val="115000"/>
+                </a:srgbClr>
+              </a:gs>
+              <a:gs pos="50000">
+                <a:srgbClr val="00B0F0">
+                  <a:shade val="67500"/>
+                  <a:satMod val="115000"/>
+                </a:srgbClr>
+              </a:gs>
+              <a:gs pos="100000">
+                <a:srgbClr val="00B0F0">
+                  <a:shade val="100000"/>
+                  <a:satMod val="115000"/>
+                </a:srgbClr>
+              </a:gs>
+            </a:gsLst>
+            <a:path path="circle">
+              <a:fillToRect t="100000" r="100000"/>
+            </a:path>
+            <a:tileRect l="-100000" b="-100000"/>
+          </a:gradFill>
+        </p:spPr>
+        <p:txBody>
+          <a:bodyPr>
+            <a:normAutofit/>
+          </a:bodyPr>
+          <a:lstStyle/>
+          <a:p>
+            <a:r>
+              <a:rPr lang="en-US" altLang="zh-TW" sz="6000" b="1" dirty="0">
+                <a:solidFill>
+                  <a:srgbClr val="FFFF00"/>
+                </a:solidFill>
+              </a:rPr>
+              <a:t>End of Chapter</a:t>
+            </a:r>
+            <a:endParaRPr lang="zh-TW" altLang="en-US" sz="6000" b="1" dirty="0">
+              <a:solidFill>
+                <a:srgbClr val="FFFF00"/>
+              </a:solidFill>
+            </a:endParaRPr>
+          </a:p>
+        </p:txBody>
+      </p:sp>
+      <p:sp>
+        <p:nvSpPr>
+          <p:cNvPr id="5" name="日期版面配置區 4"/>
+          <p:cNvSpPr>
+            <a:spLocks noGrp="1"/>
+          </p:cNvSpPr>
+          <p:nvPr>
+            <p:ph type="dt" sz="half" idx="10"/>
+          </p:nvPr>
+        </p:nvSpPr>
+        <p:spPr/>
+        <p:txBody>
+          <a:bodyPr/>
+          <a:lstStyle/>
+          <a:p>
+            <a:fld id="{4E46BE27-E923-4EC2-B046-3272AE2A3E5C}" type="datetime1">
+              <a:rPr lang="zh-TW" altLang="en-US" smtClean="0"/>
+              <a:pPr/>
+              <a:t>2020/6/28</a:t>
+            </a:fld>
+            <a:endParaRPr lang="zh-TW" altLang="en-US"/>
+          </a:p>
+        </p:txBody>
+      </p:sp>
+      <p:sp>
+        <p:nvSpPr>
+          <p:cNvPr id="6" name="投影片編號版面配置區 5"/>
+          <p:cNvSpPr>
+            <a:spLocks noGrp="1"/>
+          </p:cNvSpPr>
+          <p:nvPr>
+            <p:ph type="sldNum" sz="quarter" idx="12"/>
+          </p:nvPr>
+        </p:nvSpPr>
+        <p:spPr/>
+        <p:txBody>
+          <a:bodyPr/>
+          <a:lstStyle/>
+          <a:p>
+            <a:fld id="{E4D7E63D-91F2-4366-A2C4-1B00C9E2590E}" type="slidenum">
+              <a:rPr lang="zh-TW" altLang="en-US" smtClean="0"/>
+              <a:pPr/>
+              <a:t>13</a:t>
+            </a:fld>
+            <a:endParaRPr lang="zh-TW" altLang="en-US"/>
+          </a:p>
+        </p:txBody>
+      </p:sp>
+    </p:spTree>
+  </p:cSld>
+  <p:clrMapOvr>
+    <a:masterClrMapping/>
+  </p:clrMapOvr>
+</p:sld>
+</file>
+
+<file path=ppt/slides/slide2.xml><?xml version="1.0" encoding="utf-8"?>
+<p:sld xmlns:a="http://schemas.openxmlformats.org/drawingml/2006/main" xmlns:r="http://schemas.openxmlformats.org/officeDocument/2006/relationships" xmlns:p="http://schemas.openxmlformats.org/presentationml/2006/main">
+  <p:cSld>
+    <p:spTree>
+      <p:nvGrpSpPr>
+        <p:cNvPr id="1" name=""/>
+        <p:cNvGrpSpPr/>
+        <p:nvPr/>
+      </p:nvGrpSpPr>
+      <p:grpSpPr>
+        <a:xfrm>
+          <a:off x="0" y="0"/>
+          <a:ext cx="0" cy="0"/>
+          <a:chOff x="0" y="0"/>
+          <a:chExt cx="0" cy="0"/>
+        </a:xfrm>
+      </p:grpSpPr>
+      <p:sp>
+        <p:nvSpPr>
+          <p:cNvPr id="2" name="標題 1"/>
+          <p:cNvSpPr>
+            <a:spLocks noGrp="1"/>
+          </p:cNvSpPr>
+          <p:nvPr>
+            <p:ph type="ctrTitle"/>
+          </p:nvPr>
+        </p:nvSpPr>
+        <p:spPr>
+          <a:xfrm>
+            <a:off x="0" y="1"/>
+            <a:ext cx="9144000" cy="764704"/>
+          </a:xfrm>
+          <a:gradFill flip="none" rotWithShape="1">
+            <a:gsLst>
+              <a:gs pos="0">
+                <a:srgbClr val="C00000">
+                  <a:shade val="30000"/>
+                  <a:satMod val="115000"/>
+                </a:srgbClr>
+              </a:gs>
+              <a:gs pos="50000">
+                <a:srgbClr val="C00000">
+                  <a:shade val="67500"/>
+                  <a:satMod val="115000"/>
+                </a:srgbClr>
+              </a:gs>
+              <a:gs pos="100000">
+                <a:srgbClr val="C00000">
+                  <a:shade val="100000"/>
+                  <a:satMod val="115000"/>
+                </a:srgbClr>
+              </a:gs>
+            </a:gsLst>
+            <a:path path="circle">
+              <a:fillToRect t="100000" r="100000"/>
+            </a:path>
+            <a:tileRect l="-100000" b="-100000"/>
+          </a:gradFill>
+        </p:spPr>
+        <p:txBody>
+          <a:bodyPr>
+            <a:normAutofit/>
+          </a:bodyPr>
+          <a:lstStyle/>
+          <a:p>
+            <a:pPr algn="l"/>
+            <a:r>
+              <a:rPr lang="en-US" altLang="zh-TW" sz="3600" b="1" dirty="0">
+                <a:solidFill>
+                  <a:srgbClr val="FFFF00"/>
+                </a:solidFill>
+              </a:rPr>
+              <a:t>27 Memo</a:t>
+            </a:r>
+            <a:endParaRPr lang="zh-TW" altLang="en-US" sz="3600" b="1" dirty="0">
+              <a:solidFill>
+                <a:srgbClr val="FFFF00"/>
+              </a:solidFill>
+            </a:endParaRPr>
+          </a:p>
+        </p:txBody>
+      </p:sp>
+      <p:sp>
+        <p:nvSpPr>
+          <p:cNvPr id="3" name="副標題 2"/>
+          <p:cNvSpPr>
+            <a:spLocks noGrp="1"/>
+          </p:cNvSpPr>
+          <p:nvPr>
+            <p:ph type="subTitle" idx="1"/>
+          </p:nvPr>
+        </p:nvSpPr>
+        <p:spPr>
+          <a:xfrm>
+            <a:off x="467544" y="1340762"/>
+            <a:ext cx="8219256" cy="3960446"/>
+          </a:xfrm>
+          <a:ln>
+            <a:solidFill>
+              <a:srgbClr val="C00000"/>
+            </a:solidFill>
+          </a:ln>
+        </p:spPr>
+        <p:txBody>
+          <a:bodyPr>
+            <a:noAutofit/>
+          </a:bodyPr>
+          <a:lstStyle/>
+          <a:p>
+            <a:pPr marL="342900" indent="-342900" algn="l">
+              <a:buClr>
+                <a:srgbClr val="0070C0"/>
+              </a:buClr>
+              <a:buSzPct val="80000"/>
+              <a:buFont typeface="Wingdings" pitchFamily="2" charset="2"/>
+              <a:buChar char="u"/>
+            </a:pPr>
+            <a:r>
+              <a:rPr lang="en-US" altLang="zh-TW" sz="1800" b="1" dirty="0">
+                <a:solidFill>
+                  <a:schemeClr val="tx1"/>
+                </a:solidFill>
+                <a:latin typeface="+mj-lt"/>
+              </a:rPr>
+              <a:t>Memo</a:t>
+            </a:r>
+          </a:p>
+          <a:p>
+            <a:pPr marL="342900" indent="-342900" algn="l">
+              <a:buClr>
+                <a:srgbClr val="0070C0"/>
+              </a:buClr>
+              <a:buSzPct val="80000"/>
+              <a:buFont typeface="Wingdings" pitchFamily="2" charset="2"/>
+              <a:buChar char="u"/>
+            </a:pPr>
+            <a:r>
+              <a:rPr lang="en-US" altLang="zh-TW" sz="1800" dirty="0">
+                <a:solidFill>
+                  <a:schemeClr val="tx1"/>
+                </a:solidFill>
+                <a:latin typeface="+mj-lt"/>
+              </a:rPr>
+              <a:t>We discuss pure component in the last discussion.</a:t>
+            </a:r>
+          </a:p>
+          <a:p>
+            <a:pPr marL="342900" indent="-342900" algn="l">
+              <a:buClr>
+                <a:srgbClr val="0070C0"/>
+              </a:buClr>
+              <a:buSzPct val="80000"/>
+              <a:buFont typeface="Wingdings" pitchFamily="2" charset="2"/>
+              <a:buChar char="u"/>
+            </a:pPr>
+            <a:r>
+              <a:rPr lang="en-US" altLang="zh-TW" sz="1800" dirty="0">
+                <a:solidFill>
+                  <a:schemeClr val="tx1"/>
+                </a:solidFill>
+                <a:latin typeface="+mj-lt"/>
+              </a:rPr>
+              <a:t>The pure component only re-render the class component when there is a difference in the shallow comparison of props and state.</a:t>
+            </a:r>
+          </a:p>
+          <a:p>
+            <a:pPr marL="342900" indent="-342900" algn="l">
+              <a:buClr>
+                <a:srgbClr val="0070C0"/>
+              </a:buClr>
+              <a:buSzPct val="80000"/>
+              <a:buFont typeface="Wingdings" pitchFamily="2" charset="2"/>
+              <a:buChar char="u"/>
+            </a:pPr>
+            <a:r>
+              <a:rPr lang="en-US" altLang="zh-TW" sz="1800" dirty="0">
+                <a:solidFill>
+                  <a:schemeClr val="tx1"/>
+                </a:solidFill>
+                <a:latin typeface="+mj-lt"/>
+              </a:rPr>
+              <a:t>The pure component using the shallow component comparison of props and state and results in a performance improvement.</a:t>
+            </a:r>
+          </a:p>
+          <a:p>
+            <a:pPr marL="342900" indent="-342900" algn="l">
+              <a:buClr>
+                <a:srgbClr val="0070C0"/>
+              </a:buClr>
+              <a:buSzPct val="80000"/>
+              <a:buFont typeface="Wingdings" pitchFamily="2" charset="2"/>
+              <a:buChar char="u"/>
+            </a:pPr>
+            <a:r>
+              <a:rPr lang="en-US" altLang="zh-TW" sz="1800" dirty="0">
+                <a:solidFill>
+                  <a:schemeClr val="tx1"/>
+                </a:solidFill>
+                <a:latin typeface="+mj-lt"/>
+              </a:rPr>
+              <a:t>Pure component only works with class based components.</a:t>
+            </a:r>
+          </a:p>
+          <a:p>
+            <a:pPr marL="342900" indent="-342900" algn="l">
+              <a:buClr>
+                <a:srgbClr val="0070C0"/>
+              </a:buClr>
+              <a:buSzPct val="80000"/>
+              <a:buFont typeface="Wingdings" pitchFamily="2" charset="2"/>
+              <a:buChar char="u"/>
+            </a:pPr>
+            <a:r>
+              <a:rPr lang="en-US" altLang="zh-TW" sz="1800" dirty="0">
+                <a:solidFill>
+                  <a:schemeClr val="tx1"/>
+                </a:solidFill>
+                <a:latin typeface="+mj-lt"/>
+              </a:rPr>
+              <a:t>It would be nice if we can achieve the </a:t>
+            </a:r>
+            <a:r>
+              <a:rPr lang="en-US" altLang="zh-TW" sz="1800" b="1" dirty="0">
+                <a:solidFill>
+                  <a:srgbClr val="C00000"/>
+                </a:solidFill>
+                <a:latin typeface="+mj-lt"/>
+              </a:rPr>
+              <a:t>same in functional components </a:t>
+            </a:r>
+            <a:r>
+              <a:rPr lang="en-US" altLang="zh-TW" sz="1800" dirty="0">
+                <a:solidFill>
+                  <a:schemeClr val="tx1"/>
+                </a:solidFill>
+                <a:latin typeface="+mj-lt"/>
+              </a:rPr>
+              <a:t>as well.</a:t>
+            </a:r>
+          </a:p>
+          <a:p>
+            <a:pPr marL="342900" indent="-342900" algn="l">
+              <a:buClr>
+                <a:srgbClr val="0070C0"/>
+              </a:buClr>
+              <a:buSzPct val="80000"/>
+              <a:buFont typeface="Wingdings" pitchFamily="2" charset="2"/>
+              <a:buChar char="u"/>
+            </a:pPr>
+            <a:r>
+              <a:rPr lang="en-US" altLang="zh-TW" sz="1800" b="1" dirty="0">
+                <a:solidFill>
+                  <a:srgbClr val="C00000"/>
+                </a:solidFill>
+                <a:latin typeface="+mj-lt"/>
+              </a:rPr>
+              <a:t>That is where </a:t>
+            </a:r>
+            <a:r>
+              <a:rPr lang="en-US" altLang="zh-TW" sz="1800" b="1" dirty="0" err="1">
+                <a:solidFill>
+                  <a:srgbClr val="C00000"/>
+                </a:solidFill>
+                <a:latin typeface="+mj-lt"/>
+              </a:rPr>
+              <a:t>React.memo</a:t>
+            </a:r>
+            <a:r>
+              <a:rPr lang="en-US" altLang="zh-TW" sz="1800" b="1" dirty="0">
+                <a:solidFill>
+                  <a:srgbClr val="C00000"/>
+                </a:solidFill>
+                <a:latin typeface="+mj-lt"/>
+              </a:rPr>
+              <a:t> comes into the picture.</a:t>
+            </a:r>
+          </a:p>
+          <a:p>
+            <a:pPr marL="342900" indent="-342900" algn="l">
+              <a:buClr>
+                <a:srgbClr val="0070C0"/>
+              </a:buClr>
+              <a:buSzPct val="80000"/>
+              <a:buFont typeface="Wingdings" pitchFamily="2" charset="2"/>
+              <a:buChar char="u"/>
+            </a:pPr>
+            <a:r>
+              <a:rPr lang="en-US" altLang="zh-TW" sz="1800" b="1" dirty="0">
+                <a:solidFill>
+                  <a:srgbClr val="C00000"/>
+                </a:solidFill>
+                <a:latin typeface="+mj-lt"/>
+              </a:rPr>
+              <a:t>What is memo component?</a:t>
+            </a:r>
+          </a:p>
+          <a:p>
+            <a:pPr marL="342900" indent="-342900" algn="l">
+              <a:buClr>
+                <a:srgbClr val="0070C0"/>
+              </a:buClr>
+              <a:buSzPct val="80000"/>
+              <a:buFont typeface="Wingdings" pitchFamily="2" charset="2"/>
+              <a:buChar char="u"/>
+            </a:pPr>
+            <a:r>
+              <a:rPr lang="en-US" altLang="zh-TW" sz="1800" b="1" dirty="0">
+                <a:solidFill>
+                  <a:srgbClr val="C00000"/>
+                </a:solidFill>
+                <a:latin typeface="+mj-lt"/>
+              </a:rPr>
+              <a:t>The pure component is for class based component and the memo component is for functional component. </a:t>
+            </a:r>
+          </a:p>
+        </p:txBody>
+      </p:sp>
+      <p:sp>
+        <p:nvSpPr>
+          <p:cNvPr id="4" name="標題 1"/>
+          <p:cNvSpPr txBox="1">
+            <a:spLocks/>
+          </p:cNvSpPr>
+          <p:nvPr/>
+        </p:nvSpPr>
+        <p:spPr>
+          <a:xfrm>
+            <a:off x="0" y="764704"/>
+            <a:ext cx="9144000" cy="398616"/>
+          </a:xfrm>
+          <a:prstGeom prst="rect">
+            <a:avLst/>
+          </a:prstGeom>
+          <a:gradFill flip="none" rotWithShape="1">
+            <a:gsLst>
+              <a:gs pos="0">
+                <a:srgbClr val="00B0F0">
+                  <a:shade val="30000"/>
+                  <a:satMod val="115000"/>
+                </a:srgbClr>
+              </a:gs>
+              <a:gs pos="50000">
+                <a:srgbClr val="00B0F0">
+                  <a:shade val="67500"/>
+                  <a:satMod val="115000"/>
+                </a:srgbClr>
+              </a:gs>
+              <a:gs pos="100000">
+                <a:srgbClr val="00B0F0">
+                  <a:shade val="100000"/>
+                  <a:satMod val="115000"/>
+                </a:srgbClr>
+              </a:gs>
+            </a:gsLst>
+            <a:path path="circle">
+              <a:fillToRect t="100000" r="100000"/>
+            </a:path>
+            <a:tileRect l="-100000" b="-100000"/>
+          </a:gradFill>
+        </p:spPr>
+        <p:txBody>
+          <a:bodyPr vert="horz" lIns="91440" tIns="45720" rIns="91440" bIns="45720" rtlCol="0" anchor="ctr">
+            <a:normAutofit fontScale="92500"/>
+          </a:bodyPr>
+          <a:lstStyle/>
+          <a:p>
+            <a:r>
+              <a:rPr lang="en-US" sz="1600" dirty="0">
+                <a:hlinkClick r:id="rId2"/>
+              </a:rPr>
+              <a:t>https://www.youtube.com/watch?v=7TaBhrnPH78&amp;list=PLC3y8-rFHvwgg3vaYJgHGnModB54rxOk3&amp;index=27</a:t>
+            </a:r>
+            <a:endParaRPr lang="en-US" altLang="zh-TW" sz="1600" b="1" i="1" dirty="0"/>
+          </a:p>
+        </p:txBody>
+      </p:sp>
+      <p:sp>
+        <p:nvSpPr>
+          <p:cNvPr id="5" name="日期版面配置區 4"/>
+          <p:cNvSpPr>
+            <a:spLocks noGrp="1"/>
+          </p:cNvSpPr>
+          <p:nvPr>
+            <p:ph type="dt" sz="half" idx="10"/>
+          </p:nvPr>
+        </p:nvSpPr>
+        <p:spPr>
+          <a:xfrm>
+            <a:off x="457200" y="6356350"/>
+            <a:ext cx="2133600" cy="404246"/>
+          </a:xfrm>
+        </p:spPr>
+        <p:txBody>
+          <a:bodyPr/>
+          <a:lstStyle/>
+          <a:p>
+            <a:fld id="{A4F910E6-8D00-4BAF-8C48-9688E0B449D3}" type="datetime1">
+              <a:rPr lang="zh-TW" altLang="en-US" smtClean="0"/>
+              <a:pPr/>
+              <a:t>2020/6/28</a:t>
             </a:fld>
             <a:endParaRPr lang="zh-TW" altLang="en-US"/>
           </a:p>
@@ -4726,7 +5286,7 @@
             <a:fld id="{C389EDC9-19E3-47AC-9C57-C6A24DEA81AD}" type="datetime1">
               <a:rPr lang="zh-TW" altLang="en-US" smtClean="0"/>
               <a:pPr/>
-              <a:t>2020/5/25</a:t>
+              <a:t>2020/6/28</a:t>
             </a:fld>
             <a:endParaRPr lang="zh-TW" altLang="en-US"/>
           </a:p>
@@ -5109,7 +5669,7 @@
             <a:fld id="{A4F910E6-8D00-4BAF-8C48-9688E0B449D3}" type="datetime1">
               <a:rPr lang="zh-TW" altLang="en-US" smtClean="0"/>
               <a:pPr/>
-              <a:t>2020/5/25</a:t>
+              <a:t>2020/6/28</a:t>
             </a:fld>
             <a:endParaRPr lang="zh-TW" altLang="en-US"/>
           </a:p>
@@ -5619,7 +6179,7 @@
             <a:fld id="{A4F910E6-8D00-4BAF-8C48-9688E0B449D3}" type="datetime1">
               <a:rPr lang="zh-TW" altLang="en-US" smtClean="0"/>
               <a:pPr/>
-              <a:t>2020/5/25</a:t>
+              <a:t>2020/6/28</a:t>
             </a:fld>
             <a:endParaRPr lang="zh-TW" altLang="en-US"/>
           </a:p>
@@ -5942,7 +6502,7 @@
             <a:fld id="{C389EDC9-19E3-47AC-9C57-C6A24DEA81AD}" type="datetime1">
               <a:rPr lang="zh-TW" altLang="en-US" smtClean="0"/>
               <a:pPr/>
-              <a:t>2020/5/25</a:t>
+              <a:t>2020/6/28</a:t>
             </a:fld>
             <a:endParaRPr lang="zh-TW" altLang="en-US"/>
           </a:p>
@@ -6355,7 +6915,7 @@
             <a:fld id="{A4F910E6-8D00-4BAF-8C48-9688E0B449D3}" type="datetime1">
               <a:rPr lang="zh-TW" altLang="en-US" smtClean="0"/>
               <a:pPr/>
-              <a:t>2020/5/25</a:t>
+              <a:t>2020/6/28</a:t>
             </a:fld>
             <a:endParaRPr lang="zh-TW" altLang="en-US"/>
           </a:p>
@@ -6807,7 +7367,7 @@
             <a:fld id="{A4F910E6-8D00-4BAF-8C48-9688E0B449D3}" type="datetime1">
               <a:rPr lang="zh-TW" altLang="en-US" smtClean="0"/>
               <a:pPr/>
-              <a:t>2020/5/25</a:t>
+              <a:t>2020/6/28</a:t>
             </a:fld>
             <a:endParaRPr lang="zh-TW" altLang="en-US"/>
           </a:p>
@@ -7201,7 +7761,7 @@
             <a:fld id="{A4F910E6-8D00-4BAF-8C48-9688E0B449D3}" type="datetime1">
               <a:rPr lang="zh-TW" altLang="en-US" smtClean="0"/>
               <a:pPr/>
-              <a:t>2020/5/25</a:t>
+              <a:t>2020/6/28</a:t>
             </a:fld>
             <a:endParaRPr lang="zh-TW" altLang="en-US"/>
           </a:p>

</xml_diff>